<commit_message>
Update report: doc and ppt... something
</commit_message>
<xml_diff>
--- a/Documents/Report.pptx
+++ b/Documents/Report.pptx
@@ -267,7 +267,7 @@
           <a:p>
             <a:fld id="{07C70188-43BC-4D5A-859B-80758B29894A}" type="datetimeFigureOut">
               <a:rPr lang="en-US" smtClean="0"/>
-              <a:t>11/16/2020</a:t>
+              <a:t>11/21/2020</a:t>
             </a:fld>
             <a:endParaRPr lang="en-US"/>
           </a:p>
@@ -444,7 +444,7 @@
           <a:p>
             <a:fld id="{07C70188-43BC-4D5A-859B-80758B29894A}" type="datetimeFigureOut">
               <a:rPr lang="en-US" smtClean="0"/>
-              <a:t>11/16/2020</a:t>
+              <a:t>11/21/2020</a:t>
             </a:fld>
             <a:endParaRPr lang="en-US"/>
           </a:p>
@@ -631,7 +631,7 @@
           <a:p>
             <a:fld id="{07C70188-43BC-4D5A-859B-80758B29894A}" type="datetimeFigureOut">
               <a:rPr lang="en-US" smtClean="0"/>
-              <a:t>11/16/2020</a:t>
+              <a:t>11/21/2020</a:t>
             </a:fld>
             <a:endParaRPr lang="en-US"/>
           </a:p>
@@ -846,7 +846,7 @@
           <a:p>
             <a:fld id="{07C70188-43BC-4D5A-859B-80758B29894A}" type="datetimeFigureOut">
               <a:rPr lang="en-US" smtClean="0"/>
-              <a:t>11/16/2020</a:t>
+              <a:t>11/21/2020</a:t>
             </a:fld>
             <a:endParaRPr lang="en-US"/>
           </a:p>
@@ -1099,7 +1099,7 @@
           <a:p>
             <a:fld id="{07C70188-43BC-4D5A-859B-80758B29894A}" type="datetimeFigureOut">
               <a:rPr lang="en-US" smtClean="0"/>
-              <a:t>11/16/2020</a:t>
+              <a:t>11/21/2020</a:t>
             </a:fld>
             <a:endParaRPr lang="en-US"/>
           </a:p>
@@ -1338,7 +1338,7 @@
           <a:p>
             <a:fld id="{07C70188-43BC-4D5A-859B-80758B29894A}" type="datetimeFigureOut">
               <a:rPr lang="en-US" smtClean="0"/>
-              <a:t>11/16/2020</a:t>
+              <a:t>11/21/2020</a:t>
             </a:fld>
             <a:endParaRPr lang="en-US"/>
           </a:p>
@@ -1712,7 +1712,7 @@
           <a:p>
             <a:fld id="{07C70188-43BC-4D5A-859B-80758B29894A}" type="datetimeFigureOut">
               <a:rPr lang="en-US" smtClean="0"/>
-              <a:t>11/16/2020</a:t>
+              <a:t>11/21/2020</a:t>
             </a:fld>
             <a:endParaRPr lang="en-US"/>
           </a:p>
@@ -1842,7 +1842,7 @@
           <a:p>
             <a:fld id="{07C70188-43BC-4D5A-859B-80758B29894A}" type="datetimeFigureOut">
               <a:rPr lang="en-US" smtClean="0"/>
-              <a:t>11/16/2020</a:t>
+              <a:t>11/21/2020</a:t>
             </a:fld>
             <a:endParaRPr lang="en-US"/>
           </a:p>
@@ -1944,7 +1944,7 @@
           <a:p>
             <a:fld id="{07C70188-43BC-4D5A-859B-80758B29894A}" type="datetimeFigureOut">
               <a:rPr lang="en-US" smtClean="0"/>
-              <a:t>11/16/2020</a:t>
+              <a:t>11/21/2020</a:t>
             </a:fld>
             <a:endParaRPr lang="en-US"/>
           </a:p>
@@ -2221,7 +2221,7 @@
           <a:p>
             <a:fld id="{07C70188-43BC-4D5A-859B-80758B29894A}" type="datetimeFigureOut">
               <a:rPr lang="en-US" smtClean="0"/>
-              <a:t>11/16/2020</a:t>
+              <a:t>11/21/2020</a:t>
             </a:fld>
             <a:endParaRPr lang="en-US"/>
           </a:p>
@@ -2481,7 +2481,7 @@
           <a:p>
             <a:fld id="{07C70188-43BC-4D5A-859B-80758B29894A}" type="datetimeFigureOut">
               <a:rPr lang="en-US" smtClean="0"/>
-              <a:t>11/16/2020</a:t>
+              <a:t>11/21/2020</a:t>
             </a:fld>
             <a:endParaRPr lang="en-US"/>
           </a:p>
@@ -2724,7 +2724,7 @@
           <a:p>
             <a:fld id="{07C70188-43BC-4D5A-859B-80758B29894A}" type="datetimeFigureOut">
               <a:rPr lang="en-US" smtClean="0"/>
-              <a:t>11/16/2020</a:t>
+              <a:t>11/21/2020</a:t>
             </a:fld>
             <a:endParaRPr lang="en-US"/>
           </a:p>
@@ -3176,7 +3176,7 @@
         </p:spPr>
         <p:txBody>
           <a:bodyPr>
-            <a:normAutofit fontScale="90000"/>
+            <a:normAutofit/>
           </a:bodyPr>
           <a:lstStyle/>
           <a:p>
@@ -3223,7 +3223,33 @@
                   <a:reflection blurRad="12700" stA="28000" endPos="45000" dist="1003" dir="5400000" sy="-100000" algn="bl"/>
                 </a:effectLst>
               </a:rPr>
-              <a:t>QUẢN LÝ cửa hàng và nhân viên bán hàng</a:t>
+              <a:t>QUẢN LÝ </a:t>
+            </a:r>
+            <a:r>
+              <a:rPr lang="en-US" b="1" cap="all" dirty="0" smtClean="0">
+                <a:solidFill>
+                  <a:schemeClr val="accent1">
+                    <a:lumMod val="75000"/>
+                  </a:schemeClr>
+                </a:solidFill>
+                <a:effectLst>
+                  <a:reflection blurRad="12700" stA="28000" endPos="45000" dist="1003" dir="5400000" sy="-100000" algn="bl"/>
+                </a:effectLst>
+              </a:rPr>
+              <a:t>bán </a:t>
+            </a:r>
+            <a:r>
+              <a:rPr lang="en-US" b="1" cap="all" dirty="0">
+                <a:solidFill>
+                  <a:schemeClr val="accent1">
+                    <a:lumMod val="75000"/>
+                  </a:schemeClr>
+                </a:solidFill>
+                <a:effectLst>
+                  <a:reflection blurRad="12700" stA="28000" endPos="45000" dist="1003" dir="5400000" sy="-100000" algn="bl"/>
+                </a:effectLst>
+              </a:rPr>
+              <a:t>hàng</a:t>
             </a:r>
             <a:endParaRPr lang="en-US" dirty="0">
               <a:solidFill>
@@ -3579,8 +3605,10 @@
       </p:sp>
       <p:pic>
         <p:nvPicPr>
-          <p:cNvPr id="4" name="Picture 3"/>
-          <p:cNvPicPr/>
+          <p:cNvPr id="5" name="Picture 4"/>
+          <p:cNvPicPr>
+            <a:picLocks noChangeAspect="1"/>
+          </p:cNvPicPr>
           <p:nvPr/>
         </p:nvPicPr>
         <p:blipFill>
@@ -3717,88 +3745,6 @@
                             </p:childTnLst>
                           </p:cTn>
                         </p:par>
-                        <p:par>
-                          <p:cTn id="9" fill="hold">
-                            <p:stCondLst>
-                              <p:cond delay="500"/>
-                            </p:stCondLst>
-                            <p:childTnLst>
-                              <p:par>
-                                <p:cTn id="10" presetID="2" presetClass="entr" presetSubtype="4" fill="hold" nodeType="afterEffect">
-                                  <p:stCondLst>
-                                    <p:cond delay="0"/>
-                                  </p:stCondLst>
-                                  <p:childTnLst>
-                                    <p:set>
-                                      <p:cBhvr>
-                                        <p:cTn id="11" dur="1" fill="hold">
-                                          <p:stCondLst>
-                                            <p:cond delay="0"/>
-                                          </p:stCondLst>
-                                        </p:cTn>
-                                        <p:tgtEl>
-                                          <p:spTgt spid="4"/>
-                                        </p:tgtEl>
-                                        <p:attrNameLst>
-                                          <p:attrName>style.visibility</p:attrName>
-                                        </p:attrNameLst>
-                                      </p:cBhvr>
-                                      <p:to>
-                                        <p:strVal val="visible"/>
-                                      </p:to>
-                                    </p:set>
-                                    <p:anim calcmode="lin" valueType="num">
-                                      <p:cBhvr additive="base">
-                                        <p:cTn id="12" dur="500" fill="hold"/>
-                                        <p:tgtEl>
-                                          <p:spTgt spid="4"/>
-                                        </p:tgtEl>
-                                        <p:attrNameLst>
-                                          <p:attrName>ppt_x</p:attrName>
-                                        </p:attrNameLst>
-                                      </p:cBhvr>
-                                      <p:tavLst>
-                                        <p:tav tm="0">
-                                          <p:val>
-                                            <p:strVal val="#ppt_x"/>
-                                          </p:val>
-                                        </p:tav>
-                                        <p:tav tm="100000">
-                                          <p:val>
-                                            <p:strVal val="#ppt_x"/>
-                                          </p:val>
-                                        </p:tav>
-                                      </p:tavLst>
-                                    </p:anim>
-                                    <p:anim calcmode="lin" valueType="num">
-                                      <p:cBhvr additive="base">
-                                        <p:cTn id="13" dur="500" fill="hold"/>
-                                        <p:tgtEl>
-                                          <p:spTgt spid="4"/>
-                                        </p:tgtEl>
-                                        <p:attrNameLst>
-                                          <p:attrName>ppt_y</p:attrName>
-                                        </p:attrNameLst>
-                                      </p:cBhvr>
-                                      <p:tavLst>
-                                        <p:tav tm="0">
-                                          <p:val>
-                                            <p:strVal val="1+#ppt_h/2"/>
-                                          </p:val>
-                                        </p:tav>
-                                        <p:tav tm="100000">
-                                          <p:val>
-                                            <p:strVal val="#ppt_y"/>
-                                          </p:val>
-                                        </p:tav>
-                                      </p:tavLst>
-                                    </p:anim>
-                                  </p:childTnLst>
-                                </p:cTn>
-                              </p:par>
-                            </p:childTnLst>
-                          </p:cTn>
-                        </p:par>
                       </p:childTnLst>
                     </p:cTn>
                   </p:par>
@@ -3895,7 +3841,7 @@
       </p:sp>
       <p:pic>
         <p:nvPicPr>
-          <p:cNvPr id="4" name="Picture 3"/>
+          <p:cNvPr id="6" name="Picture 5"/>
           <p:cNvPicPr/>
           <p:nvPr/>
         </p:nvPicPr>
@@ -4033,88 +3979,6 @@
                             </p:childTnLst>
                           </p:cTn>
                         </p:par>
-                        <p:par>
-                          <p:cTn id="9" fill="hold">
-                            <p:stCondLst>
-                              <p:cond delay="500"/>
-                            </p:stCondLst>
-                            <p:childTnLst>
-                              <p:par>
-                                <p:cTn id="10" presetID="2" presetClass="entr" presetSubtype="4" fill="hold" nodeType="afterEffect">
-                                  <p:stCondLst>
-                                    <p:cond delay="0"/>
-                                  </p:stCondLst>
-                                  <p:childTnLst>
-                                    <p:set>
-                                      <p:cBhvr>
-                                        <p:cTn id="11" dur="1" fill="hold">
-                                          <p:stCondLst>
-                                            <p:cond delay="0"/>
-                                          </p:stCondLst>
-                                        </p:cTn>
-                                        <p:tgtEl>
-                                          <p:spTgt spid="4"/>
-                                        </p:tgtEl>
-                                        <p:attrNameLst>
-                                          <p:attrName>style.visibility</p:attrName>
-                                        </p:attrNameLst>
-                                      </p:cBhvr>
-                                      <p:to>
-                                        <p:strVal val="visible"/>
-                                      </p:to>
-                                    </p:set>
-                                    <p:anim calcmode="lin" valueType="num">
-                                      <p:cBhvr additive="base">
-                                        <p:cTn id="12" dur="500" fill="hold"/>
-                                        <p:tgtEl>
-                                          <p:spTgt spid="4"/>
-                                        </p:tgtEl>
-                                        <p:attrNameLst>
-                                          <p:attrName>ppt_x</p:attrName>
-                                        </p:attrNameLst>
-                                      </p:cBhvr>
-                                      <p:tavLst>
-                                        <p:tav tm="0">
-                                          <p:val>
-                                            <p:strVal val="#ppt_x"/>
-                                          </p:val>
-                                        </p:tav>
-                                        <p:tav tm="100000">
-                                          <p:val>
-                                            <p:strVal val="#ppt_x"/>
-                                          </p:val>
-                                        </p:tav>
-                                      </p:tavLst>
-                                    </p:anim>
-                                    <p:anim calcmode="lin" valueType="num">
-                                      <p:cBhvr additive="base">
-                                        <p:cTn id="13" dur="500" fill="hold"/>
-                                        <p:tgtEl>
-                                          <p:spTgt spid="4"/>
-                                        </p:tgtEl>
-                                        <p:attrNameLst>
-                                          <p:attrName>ppt_y</p:attrName>
-                                        </p:attrNameLst>
-                                      </p:cBhvr>
-                                      <p:tavLst>
-                                        <p:tav tm="0">
-                                          <p:val>
-                                            <p:strVal val="1+#ppt_h/2"/>
-                                          </p:val>
-                                        </p:tav>
-                                        <p:tav tm="100000">
-                                          <p:val>
-                                            <p:strVal val="#ppt_y"/>
-                                          </p:val>
-                                        </p:tav>
-                                      </p:tavLst>
-                                    </p:anim>
-                                  </p:childTnLst>
-                                </p:cTn>
-                              </p:par>
-                            </p:childTnLst>
-                          </p:cTn>
-                        </p:par>
                       </p:childTnLst>
                     </p:cTn>
                   </p:par>
@@ -4211,7 +4075,7 @@
       </p:sp>
       <p:pic>
         <p:nvPicPr>
-          <p:cNvPr id="4" name="Picture 3"/>
+          <p:cNvPr id="5" name="Picture 4"/>
           <p:cNvPicPr/>
           <p:nvPr/>
         </p:nvPicPr>
@@ -4349,88 +4213,6 @@
                             </p:childTnLst>
                           </p:cTn>
                         </p:par>
-                        <p:par>
-                          <p:cTn id="9" fill="hold">
-                            <p:stCondLst>
-                              <p:cond delay="500"/>
-                            </p:stCondLst>
-                            <p:childTnLst>
-                              <p:par>
-                                <p:cTn id="10" presetID="2" presetClass="entr" presetSubtype="4" fill="hold" nodeType="afterEffect">
-                                  <p:stCondLst>
-                                    <p:cond delay="0"/>
-                                  </p:stCondLst>
-                                  <p:childTnLst>
-                                    <p:set>
-                                      <p:cBhvr>
-                                        <p:cTn id="11" dur="1" fill="hold">
-                                          <p:stCondLst>
-                                            <p:cond delay="0"/>
-                                          </p:stCondLst>
-                                        </p:cTn>
-                                        <p:tgtEl>
-                                          <p:spTgt spid="4"/>
-                                        </p:tgtEl>
-                                        <p:attrNameLst>
-                                          <p:attrName>style.visibility</p:attrName>
-                                        </p:attrNameLst>
-                                      </p:cBhvr>
-                                      <p:to>
-                                        <p:strVal val="visible"/>
-                                      </p:to>
-                                    </p:set>
-                                    <p:anim calcmode="lin" valueType="num">
-                                      <p:cBhvr additive="base">
-                                        <p:cTn id="12" dur="500" fill="hold"/>
-                                        <p:tgtEl>
-                                          <p:spTgt spid="4"/>
-                                        </p:tgtEl>
-                                        <p:attrNameLst>
-                                          <p:attrName>ppt_x</p:attrName>
-                                        </p:attrNameLst>
-                                      </p:cBhvr>
-                                      <p:tavLst>
-                                        <p:tav tm="0">
-                                          <p:val>
-                                            <p:strVal val="#ppt_x"/>
-                                          </p:val>
-                                        </p:tav>
-                                        <p:tav tm="100000">
-                                          <p:val>
-                                            <p:strVal val="#ppt_x"/>
-                                          </p:val>
-                                        </p:tav>
-                                      </p:tavLst>
-                                    </p:anim>
-                                    <p:anim calcmode="lin" valueType="num">
-                                      <p:cBhvr additive="base">
-                                        <p:cTn id="13" dur="500" fill="hold"/>
-                                        <p:tgtEl>
-                                          <p:spTgt spid="4"/>
-                                        </p:tgtEl>
-                                        <p:attrNameLst>
-                                          <p:attrName>ppt_y</p:attrName>
-                                        </p:attrNameLst>
-                                      </p:cBhvr>
-                                      <p:tavLst>
-                                        <p:tav tm="0">
-                                          <p:val>
-                                            <p:strVal val="1+#ppt_h/2"/>
-                                          </p:val>
-                                        </p:tav>
-                                        <p:tav tm="100000">
-                                          <p:val>
-                                            <p:strVal val="#ppt_y"/>
-                                          </p:val>
-                                        </p:tav>
-                                      </p:tavLst>
-                                    </p:anim>
-                                  </p:childTnLst>
-                                </p:cTn>
-                              </p:par>
-                            </p:childTnLst>
-                          </p:cTn>
-                        </p:par>
                       </p:childTnLst>
                     </p:cTn>
                   </p:par>
@@ -4527,7 +4309,7 @@
       </p:sp>
       <p:pic>
         <p:nvPicPr>
-          <p:cNvPr id="4" name="Picture 3"/>
+          <p:cNvPr id="5" name="Picture 4"/>
           <p:cNvPicPr/>
           <p:nvPr/>
         </p:nvPicPr>
@@ -4539,8 +4321,30 @@
         </p:blipFill>
         <p:spPr>
           <a:xfrm>
-            <a:off x="2438400" y="2519363"/>
-            <a:ext cx="7315200" cy="3657600"/>
+            <a:off x="838200" y="2397400"/>
+            <a:ext cx="5085945" cy="2622074"/>
+          </a:xfrm>
+          <a:prstGeom prst="rect">
+            <a:avLst/>
+          </a:prstGeom>
+        </p:spPr>
+      </p:pic>
+      <p:pic>
+        <p:nvPicPr>
+          <p:cNvPr id="6" name="Picture 5"/>
+          <p:cNvPicPr/>
+          <p:nvPr/>
+        </p:nvPicPr>
+        <p:blipFill>
+          <a:blip r:embed="rId3"/>
+          <a:stretch>
+            <a:fillRect/>
+          </a:stretch>
+        </p:blipFill>
+        <p:spPr>
+          <a:xfrm>
+            <a:off x="6096000" y="3551196"/>
+            <a:ext cx="5084064" cy="2625767"/>
           </a:xfrm>
           <a:prstGeom prst="rect">
             <a:avLst/>
@@ -4641,88 +4445,6 @@
                                               <p:pRg st="0" end="0"/>
                                             </p:txEl>
                                           </p:spTgt>
-                                        </p:tgtEl>
-                                        <p:attrNameLst>
-                                          <p:attrName>ppt_y</p:attrName>
-                                        </p:attrNameLst>
-                                      </p:cBhvr>
-                                      <p:tavLst>
-                                        <p:tav tm="0">
-                                          <p:val>
-                                            <p:strVal val="1+#ppt_h/2"/>
-                                          </p:val>
-                                        </p:tav>
-                                        <p:tav tm="100000">
-                                          <p:val>
-                                            <p:strVal val="#ppt_y"/>
-                                          </p:val>
-                                        </p:tav>
-                                      </p:tavLst>
-                                    </p:anim>
-                                  </p:childTnLst>
-                                </p:cTn>
-                              </p:par>
-                            </p:childTnLst>
-                          </p:cTn>
-                        </p:par>
-                        <p:par>
-                          <p:cTn id="9" fill="hold">
-                            <p:stCondLst>
-                              <p:cond delay="500"/>
-                            </p:stCondLst>
-                            <p:childTnLst>
-                              <p:par>
-                                <p:cTn id="10" presetID="2" presetClass="entr" presetSubtype="4" fill="hold" nodeType="afterEffect">
-                                  <p:stCondLst>
-                                    <p:cond delay="0"/>
-                                  </p:stCondLst>
-                                  <p:childTnLst>
-                                    <p:set>
-                                      <p:cBhvr>
-                                        <p:cTn id="11" dur="1" fill="hold">
-                                          <p:stCondLst>
-                                            <p:cond delay="0"/>
-                                          </p:stCondLst>
-                                        </p:cTn>
-                                        <p:tgtEl>
-                                          <p:spTgt spid="4"/>
-                                        </p:tgtEl>
-                                        <p:attrNameLst>
-                                          <p:attrName>style.visibility</p:attrName>
-                                        </p:attrNameLst>
-                                      </p:cBhvr>
-                                      <p:to>
-                                        <p:strVal val="visible"/>
-                                      </p:to>
-                                    </p:set>
-                                    <p:anim calcmode="lin" valueType="num">
-                                      <p:cBhvr additive="base">
-                                        <p:cTn id="12" dur="500" fill="hold"/>
-                                        <p:tgtEl>
-                                          <p:spTgt spid="4"/>
-                                        </p:tgtEl>
-                                        <p:attrNameLst>
-                                          <p:attrName>ppt_x</p:attrName>
-                                        </p:attrNameLst>
-                                      </p:cBhvr>
-                                      <p:tavLst>
-                                        <p:tav tm="0">
-                                          <p:val>
-                                            <p:strVal val="#ppt_x"/>
-                                          </p:val>
-                                        </p:tav>
-                                        <p:tav tm="100000">
-                                          <p:val>
-                                            <p:strVal val="#ppt_x"/>
-                                          </p:val>
-                                        </p:tav>
-                                      </p:tavLst>
-                                    </p:anim>
-                                    <p:anim calcmode="lin" valueType="num">
-                                      <p:cBhvr additive="base">
-                                        <p:cTn id="13" dur="500" fill="hold"/>
-                                        <p:tgtEl>
-                                          <p:spTgt spid="4"/>
                                         </p:tgtEl>
                                         <p:attrNameLst>
                                           <p:attrName>ppt_y</p:attrName>
@@ -5682,14 +5404,14 @@
             <p:ph idx="1"/>
             <p:extLst>
               <p:ext uri="{D42A27DB-BD31-4B8C-83A1-F6EECF244321}">
-                <p14:modId xmlns:p14="http://schemas.microsoft.com/office/powerpoint/2010/main" val="2317595528"/>
+                <p14:modId xmlns:p14="http://schemas.microsoft.com/office/powerpoint/2010/main" val="1442634373"/>
               </p:ext>
             </p:extLst>
           </p:nvPr>
         </p:nvGraphicFramePr>
         <p:xfrm>
           <a:off x="838200" y="2338650"/>
-          <a:ext cx="10515600" cy="3021291"/>
+          <a:ext cx="10515600" cy="3254105"/>
         </p:xfrm>
         <a:graphic>
           <a:graphicData uri="http://schemas.openxmlformats.org/drawingml/2006/table">
@@ -5852,14 +5574,23 @@
                         <a:buChar char=""/>
                       </a:pPr>
                       <a:r>
-                        <a:rPr lang="en-US" sz="1300" dirty="0">
+                        <a:rPr lang="en-US" sz="1300" dirty="0" smtClean="0">
                           <a:effectLst/>
                         </a:rPr>
-                        <a:t>Thực hiện phần Giao diện, Quản lý Sản phẩm, Nhập bằng Excel và Quản lý Lịch sử.</a:t>
+                        <a:t>Thực hiện phần Giao diện, Quản lý Sản phẩm, Quản lý Lịch sử và</a:t>
                       </a:r>
-                      <a:endParaRPr lang="en-US" sz="1400" dirty="0">
-                        <a:effectLst/>
-                      </a:endParaRPr>
+                      <a:r>
+                        <a:rPr lang="en-US" sz="1300" baseline="0" dirty="0" smtClean="0">
+                          <a:effectLst/>
+                        </a:rPr>
+                        <a:t> </a:t>
+                      </a:r>
+                      <a:r>
+                        <a:rPr lang="en-US" sz="1300" dirty="0" smtClean="0">
+                          <a:effectLst/>
+                        </a:rPr>
+                        <a:t>Nhập bằng Excel.</a:t>
+                      </a:r>
                     </a:p>
                     <a:p>
                       <a:pPr marL="342900" marR="0" lvl="0" indent="-342900">
@@ -5876,17 +5607,11 @@
                         <a:buChar char=""/>
                       </a:pPr>
                       <a:r>
-                        <a:rPr lang="en-US" sz="1300" dirty="0">
+                        <a:rPr lang="en-US" sz="1300" dirty="0" smtClean="0">
                           <a:effectLst/>
                         </a:rPr>
                         <a:t>Viết báo cáo đồ án</a:t>
                       </a:r>
-                      <a:endParaRPr lang="en-US" sz="1400" dirty="0">
-                        <a:effectLst/>
-                        <a:latin typeface="Times New Roman" panose="02020603050405020304" pitchFamily="18" charset="0"/>
-                        <a:ea typeface="Calibri" panose="020F0502020204030204" pitchFamily="34" charset="0"/>
-                        <a:cs typeface="Times New Roman" panose="02020603050405020304" pitchFamily="18" charset="0"/>
-                      </a:endParaRPr>
                     </a:p>
                   </a:txBody>
                   <a:tcPr marL="68580" marR="68580" marT="0" marB="0" anchor="ctr"/>
@@ -5908,12 +5633,12 @@
                         </a:spcAft>
                       </a:pPr>
                       <a:r>
-                        <a:rPr lang="en-US" sz="1300">
+                        <a:rPr lang="en-US" sz="1300" dirty="0" smtClean="0">
                           <a:effectLst/>
                         </a:rPr>
-                        <a:t>16/11/2019</a:t>
+                        <a:t>21/11/2019</a:t>
                       </a:r>
-                      <a:endParaRPr lang="en-US" sz="1400">
+                      <a:endParaRPr lang="en-US" sz="1400" dirty="0">
                         <a:effectLst/>
                         <a:latin typeface="Times New Roman" panose="02020603050405020304" pitchFamily="18" charset="0"/>
                         <a:ea typeface="Calibri" panose="020F0502020204030204" pitchFamily="34" charset="0"/>
@@ -5976,14 +5701,11 @@
                         <a:buChar char=""/>
                       </a:pPr>
                       <a:r>
-                        <a:rPr lang="en-US" sz="1300" dirty="0">
+                        <a:rPr lang="en-US" sz="1300" dirty="0" smtClean="0">
                           <a:effectLst/>
                         </a:rPr>
                         <a:t>Thực hiện phần Database, Quản lý sản phẩm, Quản lý Lịch sử, Admin và quản lý Nhân viên</a:t>
                       </a:r>
-                      <a:endParaRPr lang="en-US" sz="1400" dirty="0">
-                        <a:effectLst/>
-                      </a:endParaRPr>
                     </a:p>
                     <a:p>
                       <a:pPr marL="342900" marR="0" lvl="0" indent="-342900">
@@ -6000,17 +5722,11 @@
                         <a:buChar char=""/>
                       </a:pPr>
                       <a:r>
-                        <a:rPr lang="en-US" sz="1300" dirty="0">
+                        <a:rPr lang="en-US" sz="1300" dirty="0" smtClean="0">
                           <a:effectLst/>
                         </a:rPr>
-                        <a:t>Bảo trì và sửa chữa</a:t>
+                        <a:t>Bảo trì, sửa chữa và thực nghiệm.</a:t>
                       </a:r>
-                      <a:endParaRPr lang="en-US" sz="1400" dirty="0">
-                        <a:effectLst/>
-                        <a:latin typeface="Times New Roman" panose="02020603050405020304" pitchFamily="18" charset="0"/>
-                        <a:ea typeface="Calibri" panose="020F0502020204030204" pitchFamily="34" charset="0"/>
-                        <a:cs typeface="Times New Roman" panose="02020603050405020304" pitchFamily="18" charset="0"/>
-                      </a:endParaRPr>
                     </a:p>
                   </a:txBody>
                   <a:tcPr marL="68580" marR="68580" marT="0" marB="0" anchor="ctr"/>
@@ -6032,12 +5748,12 @@
                         </a:spcAft>
                       </a:pPr>
                       <a:r>
-                        <a:rPr lang="en-US" sz="1300">
+                        <a:rPr lang="en-US" sz="1300" dirty="0" smtClean="0">
                           <a:effectLst/>
                         </a:rPr>
-                        <a:t>16/11/2019</a:t>
+                        <a:t>21/11/2019</a:t>
                       </a:r>
-                      <a:endParaRPr lang="en-US" sz="1400">
+                      <a:endParaRPr lang="en-US" sz="1400" dirty="0">
                         <a:effectLst/>
                         <a:latin typeface="Times New Roman" panose="02020603050405020304" pitchFamily="18" charset="0"/>
                         <a:ea typeface="Calibri" panose="020F0502020204030204" pitchFamily="34" charset="0"/>
@@ -6100,17 +5816,32 @@
                         <a:buChar char=""/>
                       </a:pPr>
                       <a:r>
-                        <a:rPr lang="en-US" sz="1300" dirty="0">
+                        <a:rPr lang="en-US" sz="1300" dirty="0" smtClean="0">
                           <a:effectLst/>
                         </a:rPr>
                         <a:t>Thực hiện phần Quản lý Bán hàng.</a:t>
                       </a:r>
-                      <a:endParaRPr lang="en-US" sz="1400" dirty="0">
-                        <a:effectLst/>
-                        <a:latin typeface="Times New Roman" panose="02020603050405020304" pitchFamily="18" charset="0"/>
-                        <a:ea typeface="Calibri" panose="020F0502020204030204" pitchFamily="34" charset="0"/>
-                        <a:cs typeface="Times New Roman" panose="02020603050405020304" pitchFamily="18" charset="0"/>
-                      </a:endParaRPr>
+                    </a:p>
+                    <a:p>
+                      <a:pPr marL="342900" marR="0" lvl="0" indent="-342900">
+                        <a:lnSpc>
+                          <a:spcPct val="115000"/>
+                        </a:lnSpc>
+                        <a:spcBef>
+                          <a:spcPts val="0"/>
+                        </a:spcBef>
+                        <a:spcAft>
+                          <a:spcPts val="0"/>
+                        </a:spcAft>
+                        <a:buFont typeface="Symbol" panose="05050102010706020507" pitchFamily="18" charset="2"/>
+                        <a:buChar char=""/>
+                      </a:pPr>
+                      <a:r>
+                        <a:rPr lang="en-US" sz="1300" dirty="0" smtClean="0">
+                          <a:effectLst/>
+                        </a:rPr>
+                        <a:t>Sửa chữa và thực nghiệm.</a:t>
+                      </a:r>
                     </a:p>
                   </a:txBody>
                   <a:tcPr marL="68580" marR="68580" marT="0" marB="0" anchor="ctr"/>
@@ -6132,12 +5863,12 @@
                         </a:spcAft>
                       </a:pPr>
                       <a:r>
-                        <a:rPr lang="en-US" sz="1300">
+                        <a:rPr lang="en-US" sz="1300" dirty="0" smtClean="0">
                           <a:effectLst/>
                         </a:rPr>
-                        <a:t>16/11/2019</a:t>
+                        <a:t>21/11/2019</a:t>
                       </a:r>
-                      <a:endParaRPr lang="en-US" sz="1400">
+                      <a:endParaRPr lang="en-US" sz="1400" dirty="0">
                         <a:effectLst/>
                         <a:latin typeface="Times New Roman" panose="02020603050405020304" pitchFamily="18" charset="0"/>
                         <a:ea typeface="Calibri" panose="020F0502020204030204" pitchFamily="34" charset="0"/>
@@ -6200,16 +5931,34 @@
                         <a:buChar char=""/>
                       </a:pPr>
                       <a:r>
-                        <a:rPr lang="en-US" sz="1300" dirty="0">
+                        <a:rPr lang="en-US" sz="1300" dirty="0" smtClean="0">
                           <a:effectLst/>
                         </a:rPr>
                         <a:t>Thực hiện phần Quản lý Thống kê</a:t>
                       </a:r>
-                      <a:endParaRPr lang="en-US" sz="1400" dirty="0">
+                    </a:p>
+                    <a:p>
+                      <a:pPr marL="342900" marR="0" lvl="0" indent="-342900">
+                        <a:lnSpc>
+                          <a:spcPct val="115000"/>
+                        </a:lnSpc>
+                        <a:spcBef>
+                          <a:spcPts val="0"/>
+                        </a:spcBef>
+                        <a:spcAft>
+                          <a:spcPts val="0"/>
+                        </a:spcAft>
+                        <a:buFont typeface="Symbol" panose="05050102010706020507" pitchFamily="18" charset="2"/>
+                        <a:buChar char=""/>
+                      </a:pPr>
+                      <a:r>
+                        <a:rPr lang="en-US" sz="1300" dirty="0" smtClean="0">
+                          <a:effectLst/>
+                        </a:rPr>
+                        <a:t>Sửa  chữa và thực nghiệm</a:t>
+                      </a:r>
+                      <a:endParaRPr lang="en-US" sz="1300" dirty="0">
                         <a:effectLst/>
-                        <a:latin typeface="Times New Roman" panose="02020603050405020304" pitchFamily="18" charset="0"/>
-                        <a:ea typeface="Calibri" panose="020F0502020204030204" pitchFamily="34" charset="0"/>
-                        <a:cs typeface="Times New Roman" panose="02020603050405020304" pitchFamily="18" charset="0"/>
                       </a:endParaRPr>
                     </a:p>
                   </a:txBody>
@@ -6232,10 +5981,10 @@
                         </a:spcAft>
                       </a:pPr>
                       <a:r>
-                        <a:rPr lang="en-US" sz="1300" dirty="0">
+                        <a:rPr lang="en-US" sz="1300" dirty="0" smtClean="0">
                           <a:effectLst/>
                         </a:rPr>
-                        <a:t>16/11/2020</a:t>
+                        <a:t>21/11/2020</a:t>
                       </a:r>
                       <a:endParaRPr lang="en-US" sz="1400" dirty="0">
                         <a:effectLst/>
@@ -6451,7 +6200,15 @@
             </a:r>
             <a:r>
               <a:rPr lang="en-US" b="1" i="1" dirty="0"/>
-              <a:t>mềm quản lý nhân viên bán hàng</a:t>
+              <a:t>mềm quản lý </a:t>
+            </a:r>
+            <a:r>
+              <a:rPr lang="en-US" b="1" i="1" dirty="0" smtClean="0"/>
+              <a:t>bán </a:t>
+            </a:r>
+            <a:r>
+              <a:rPr lang="en-US" b="1" i="1" dirty="0"/>
+              <a:t>hàng</a:t>
             </a:r>
             <a:r>
               <a:rPr lang="en-US" dirty="0"/>
@@ -7613,8 +7370,10 @@
       </p:sp>
       <p:pic>
         <p:nvPicPr>
-          <p:cNvPr id="4" name="Picture 3"/>
-          <p:cNvPicPr/>
+          <p:cNvPr id="2" name="Picture 1"/>
+          <p:cNvPicPr>
+            <a:picLocks noChangeAspect="1"/>
+          </p:cNvPicPr>
           <p:nvPr/>
         </p:nvPicPr>
         <p:blipFill>
@@ -7625,8 +7384,8 @@
         </p:blipFill>
         <p:spPr>
           <a:xfrm>
-            <a:off x="243840" y="811530"/>
-            <a:ext cx="5943600" cy="2617470"/>
+            <a:off x="468291" y="962301"/>
+            <a:ext cx="5944115" cy="2304488"/>
           </a:xfrm>
           <a:prstGeom prst="rect">
             <a:avLst/>
@@ -7635,8 +7394,10 @@
       </p:pic>
       <p:pic>
         <p:nvPicPr>
-          <p:cNvPr id="5" name="Picture 4"/>
-          <p:cNvPicPr/>
+          <p:cNvPr id="6" name="Picture 5"/>
+          <p:cNvPicPr>
+            <a:picLocks noChangeAspect="1"/>
+          </p:cNvPicPr>
           <p:nvPr/>
         </p:nvPicPr>
         <p:blipFill>
@@ -7647,8 +7408,8 @@
         </p:blipFill>
         <p:spPr>
           <a:xfrm>
-            <a:off x="5675376" y="3545142"/>
-            <a:ext cx="5943600" cy="3086735"/>
+            <a:off x="5536401" y="3872474"/>
+            <a:ext cx="5944115" cy="1956986"/>
           </a:xfrm>
           <a:prstGeom prst="rect">
             <a:avLst/>
@@ -7773,179 +7534,6 @@
                             </p:childTnLst>
                           </p:cTn>
                         </p:par>
-                        <p:par>
-                          <p:cTn id="9" fill="hold">
-                            <p:stCondLst>
-                              <p:cond delay="500"/>
-                            </p:stCondLst>
-                            <p:childTnLst>
-                              <p:par>
-                                <p:cTn id="10" presetID="2" presetClass="entr" presetSubtype="4" fill="hold" nodeType="afterEffect">
-                                  <p:stCondLst>
-                                    <p:cond delay="0"/>
-                                  </p:stCondLst>
-                                  <p:childTnLst>
-                                    <p:set>
-                                      <p:cBhvr>
-                                        <p:cTn id="11" dur="1" fill="hold">
-                                          <p:stCondLst>
-                                            <p:cond delay="0"/>
-                                          </p:stCondLst>
-                                        </p:cTn>
-                                        <p:tgtEl>
-                                          <p:spTgt spid="4"/>
-                                        </p:tgtEl>
-                                        <p:attrNameLst>
-                                          <p:attrName>style.visibility</p:attrName>
-                                        </p:attrNameLst>
-                                      </p:cBhvr>
-                                      <p:to>
-                                        <p:strVal val="visible"/>
-                                      </p:to>
-                                    </p:set>
-                                    <p:anim calcmode="lin" valueType="num">
-                                      <p:cBhvr additive="base">
-                                        <p:cTn id="12" dur="500" fill="hold"/>
-                                        <p:tgtEl>
-                                          <p:spTgt spid="4"/>
-                                        </p:tgtEl>
-                                        <p:attrNameLst>
-                                          <p:attrName>ppt_x</p:attrName>
-                                        </p:attrNameLst>
-                                      </p:cBhvr>
-                                      <p:tavLst>
-                                        <p:tav tm="0">
-                                          <p:val>
-                                            <p:strVal val="#ppt_x"/>
-                                          </p:val>
-                                        </p:tav>
-                                        <p:tav tm="100000">
-                                          <p:val>
-                                            <p:strVal val="#ppt_x"/>
-                                          </p:val>
-                                        </p:tav>
-                                      </p:tavLst>
-                                    </p:anim>
-                                    <p:anim calcmode="lin" valueType="num">
-                                      <p:cBhvr additive="base">
-                                        <p:cTn id="13" dur="500" fill="hold"/>
-                                        <p:tgtEl>
-                                          <p:spTgt spid="4"/>
-                                        </p:tgtEl>
-                                        <p:attrNameLst>
-                                          <p:attrName>ppt_y</p:attrName>
-                                        </p:attrNameLst>
-                                      </p:cBhvr>
-                                      <p:tavLst>
-                                        <p:tav tm="0">
-                                          <p:val>
-                                            <p:strVal val="1+#ppt_h/2"/>
-                                          </p:val>
-                                        </p:tav>
-                                        <p:tav tm="100000">
-                                          <p:val>
-                                            <p:strVal val="#ppt_y"/>
-                                          </p:val>
-                                        </p:tav>
-                                      </p:tavLst>
-                                    </p:anim>
-                                  </p:childTnLst>
-                                </p:cTn>
-                              </p:par>
-                            </p:childTnLst>
-                          </p:cTn>
-                        </p:par>
-                      </p:childTnLst>
-                    </p:cTn>
-                  </p:par>
-                  <p:par>
-                    <p:cTn id="14" fill="hold">
-                      <p:stCondLst>
-                        <p:cond delay="indefinite"/>
-                      </p:stCondLst>
-                      <p:childTnLst>
-                        <p:par>
-                          <p:cTn id="15" fill="hold">
-                            <p:stCondLst>
-                              <p:cond delay="0"/>
-                            </p:stCondLst>
-                            <p:childTnLst>
-                              <p:par>
-                                <p:cTn id="16" presetID="2" presetClass="entr" presetSubtype="4" fill="hold" nodeType="clickEffect">
-                                  <p:stCondLst>
-                                    <p:cond delay="0"/>
-                                  </p:stCondLst>
-                                  <p:childTnLst>
-                                    <p:set>
-                                      <p:cBhvr>
-                                        <p:cTn id="17" dur="1" fill="hold">
-                                          <p:stCondLst>
-                                            <p:cond delay="0"/>
-                                          </p:stCondLst>
-                                        </p:cTn>
-                                        <p:tgtEl>
-                                          <p:spTgt spid="5"/>
-                                        </p:tgtEl>
-                                        <p:attrNameLst>
-                                          <p:attrName>style.visibility</p:attrName>
-                                        </p:attrNameLst>
-                                      </p:cBhvr>
-                                      <p:to>
-                                        <p:strVal val="visible"/>
-                                      </p:to>
-                                    </p:set>
-                                    <p:anim calcmode="lin" valueType="num">
-                                      <p:cBhvr additive="base">
-                                        <p:cTn id="18" dur="500" fill="hold"/>
-                                        <p:tgtEl>
-                                          <p:spTgt spid="5"/>
-                                        </p:tgtEl>
-                                        <p:attrNameLst>
-                                          <p:attrName>ppt_x</p:attrName>
-                                        </p:attrNameLst>
-                                      </p:cBhvr>
-                                      <p:tavLst>
-                                        <p:tav tm="0">
-                                          <p:val>
-                                            <p:strVal val="#ppt_x"/>
-                                          </p:val>
-                                        </p:tav>
-                                        <p:tav tm="100000">
-                                          <p:val>
-                                            <p:strVal val="#ppt_x"/>
-                                          </p:val>
-                                        </p:tav>
-                                      </p:tavLst>
-                                    </p:anim>
-                                    <p:anim calcmode="lin" valueType="num">
-                                      <p:cBhvr additive="base">
-                                        <p:cTn id="19" dur="500" fill="hold"/>
-                                        <p:tgtEl>
-                                          <p:spTgt spid="5"/>
-                                        </p:tgtEl>
-                                        <p:attrNameLst>
-                                          <p:attrName>ppt_y</p:attrName>
-                                        </p:attrNameLst>
-                                      </p:cBhvr>
-                                      <p:tavLst>
-                                        <p:tav tm="0">
-                                          <p:val>
-                                            <p:strVal val="1+#ppt_h/2"/>
-                                          </p:val>
-                                        </p:tav>
-                                        <p:tav tm="100000">
-                                          <p:val>
-                                            <p:strVal val="#ppt_y"/>
-                                          </p:val>
-                                        </p:tav>
-                                      </p:tavLst>
-                                    </p:anim>
-                                  </p:childTnLst>
-                                </p:cTn>
-                              </p:par>
-                            </p:childTnLst>
-                          </p:cTn>
-                        </p:par>
                       </p:childTnLst>
                     </p:cTn>
                   </p:par>
@@ -8042,7 +7630,7 @@
       </p:sp>
       <p:pic>
         <p:nvPicPr>
-          <p:cNvPr id="4" name="Picture 3"/>
+          <p:cNvPr id="6" name="Picture 5"/>
           <p:cNvPicPr/>
           <p:nvPr/>
         </p:nvPicPr>
@@ -8054,7 +7642,7 @@
         </p:blipFill>
         <p:spPr>
           <a:xfrm>
-            <a:off x="2438400" y="2519363"/>
+            <a:off x="2438400" y="2532317"/>
             <a:ext cx="7315200" cy="3657600"/>
           </a:xfrm>
           <a:prstGeom prst="rect">
@@ -8156,88 +7744,6 @@
                                               <p:pRg st="0" end="0"/>
                                             </p:txEl>
                                           </p:spTgt>
-                                        </p:tgtEl>
-                                        <p:attrNameLst>
-                                          <p:attrName>ppt_y</p:attrName>
-                                        </p:attrNameLst>
-                                      </p:cBhvr>
-                                      <p:tavLst>
-                                        <p:tav tm="0">
-                                          <p:val>
-                                            <p:strVal val="1+#ppt_h/2"/>
-                                          </p:val>
-                                        </p:tav>
-                                        <p:tav tm="100000">
-                                          <p:val>
-                                            <p:strVal val="#ppt_y"/>
-                                          </p:val>
-                                        </p:tav>
-                                      </p:tavLst>
-                                    </p:anim>
-                                  </p:childTnLst>
-                                </p:cTn>
-                              </p:par>
-                            </p:childTnLst>
-                          </p:cTn>
-                        </p:par>
-                        <p:par>
-                          <p:cTn id="9" fill="hold">
-                            <p:stCondLst>
-                              <p:cond delay="500"/>
-                            </p:stCondLst>
-                            <p:childTnLst>
-                              <p:par>
-                                <p:cTn id="10" presetID="2" presetClass="entr" presetSubtype="4" fill="hold" nodeType="afterEffect">
-                                  <p:stCondLst>
-                                    <p:cond delay="0"/>
-                                  </p:stCondLst>
-                                  <p:childTnLst>
-                                    <p:set>
-                                      <p:cBhvr>
-                                        <p:cTn id="11" dur="1" fill="hold">
-                                          <p:stCondLst>
-                                            <p:cond delay="0"/>
-                                          </p:stCondLst>
-                                        </p:cTn>
-                                        <p:tgtEl>
-                                          <p:spTgt spid="4"/>
-                                        </p:tgtEl>
-                                        <p:attrNameLst>
-                                          <p:attrName>style.visibility</p:attrName>
-                                        </p:attrNameLst>
-                                      </p:cBhvr>
-                                      <p:to>
-                                        <p:strVal val="visible"/>
-                                      </p:to>
-                                    </p:set>
-                                    <p:anim calcmode="lin" valueType="num">
-                                      <p:cBhvr additive="base">
-                                        <p:cTn id="12" dur="500" fill="hold"/>
-                                        <p:tgtEl>
-                                          <p:spTgt spid="4"/>
-                                        </p:tgtEl>
-                                        <p:attrNameLst>
-                                          <p:attrName>ppt_x</p:attrName>
-                                        </p:attrNameLst>
-                                      </p:cBhvr>
-                                      <p:tavLst>
-                                        <p:tav tm="0">
-                                          <p:val>
-                                            <p:strVal val="#ppt_x"/>
-                                          </p:val>
-                                        </p:tav>
-                                        <p:tav tm="100000">
-                                          <p:val>
-                                            <p:strVal val="#ppt_x"/>
-                                          </p:val>
-                                        </p:tav>
-                                      </p:tavLst>
-                                    </p:anim>
-                                    <p:anim calcmode="lin" valueType="num">
-                                      <p:cBhvr additive="base">
-                                        <p:cTn id="13" dur="500" fill="hold"/>
-                                        <p:tgtEl>
-                                          <p:spTgt spid="4"/>
                                         </p:tgtEl>
                                         <p:attrNameLst>
                                           <p:attrName>ppt_y</p:attrName>

</xml_diff>